<commit_message>
Release23.06.01 Backlog Grooming Done
Release23.06.01 Backlog Grooming Done
</commit_message>
<xml_diff>
--- a/Offline/Marketring/AnodiamMarketing.pptx
+++ b/Offline/Marketring/AnodiamMarketing.pptx
@@ -244,7 +244,7 @@
           <a:p>
             <a:fld id="{CA6D4F87-9B9E-4A4F-B3AC-3968D7D2EB59}" type="datetimeFigureOut">
               <a:rPr lang="en-AU" smtClean="0"/>
-              <a:t>26/05/2023</a:t>
+              <a:t>29/05/2023</a:t>
             </a:fld>
             <a:endParaRPr lang="en-AU"/>
           </a:p>
@@ -414,7 +414,7 @@
           <a:p>
             <a:fld id="{CA6D4F87-9B9E-4A4F-B3AC-3968D7D2EB59}" type="datetimeFigureOut">
               <a:rPr lang="en-AU" smtClean="0"/>
-              <a:t>26/05/2023</a:t>
+              <a:t>29/05/2023</a:t>
             </a:fld>
             <a:endParaRPr lang="en-AU"/>
           </a:p>
@@ -594,7 +594,7 @@
           <a:p>
             <a:fld id="{CA6D4F87-9B9E-4A4F-B3AC-3968D7D2EB59}" type="datetimeFigureOut">
               <a:rPr lang="en-AU" smtClean="0"/>
-              <a:t>26/05/2023</a:t>
+              <a:t>29/05/2023</a:t>
             </a:fld>
             <a:endParaRPr lang="en-AU"/>
           </a:p>
@@ -764,7 +764,7 @@
           <a:p>
             <a:fld id="{CA6D4F87-9B9E-4A4F-B3AC-3968D7D2EB59}" type="datetimeFigureOut">
               <a:rPr lang="en-AU" smtClean="0"/>
-              <a:t>26/05/2023</a:t>
+              <a:t>29/05/2023</a:t>
             </a:fld>
             <a:endParaRPr lang="en-AU"/>
           </a:p>
@@ -1010,7 +1010,7 @@
           <a:p>
             <a:fld id="{CA6D4F87-9B9E-4A4F-B3AC-3968D7D2EB59}" type="datetimeFigureOut">
               <a:rPr lang="en-AU" smtClean="0"/>
-              <a:t>26/05/2023</a:t>
+              <a:t>29/05/2023</a:t>
             </a:fld>
             <a:endParaRPr lang="en-AU"/>
           </a:p>
@@ -1242,7 +1242,7 @@
           <a:p>
             <a:fld id="{CA6D4F87-9B9E-4A4F-B3AC-3968D7D2EB59}" type="datetimeFigureOut">
               <a:rPr lang="en-AU" smtClean="0"/>
-              <a:t>26/05/2023</a:t>
+              <a:t>29/05/2023</a:t>
             </a:fld>
             <a:endParaRPr lang="en-AU"/>
           </a:p>
@@ -1609,7 +1609,7 @@
           <a:p>
             <a:fld id="{CA6D4F87-9B9E-4A4F-B3AC-3968D7D2EB59}" type="datetimeFigureOut">
               <a:rPr lang="en-AU" smtClean="0"/>
-              <a:t>26/05/2023</a:t>
+              <a:t>29/05/2023</a:t>
             </a:fld>
             <a:endParaRPr lang="en-AU"/>
           </a:p>
@@ -1727,7 +1727,7 @@
           <a:p>
             <a:fld id="{CA6D4F87-9B9E-4A4F-B3AC-3968D7D2EB59}" type="datetimeFigureOut">
               <a:rPr lang="en-AU" smtClean="0"/>
-              <a:t>26/05/2023</a:t>
+              <a:t>29/05/2023</a:t>
             </a:fld>
             <a:endParaRPr lang="en-AU"/>
           </a:p>
@@ -1822,7 +1822,7 @@
           <a:p>
             <a:fld id="{CA6D4F87-9B9E-4A4F-B3AC-3968D7D2EB59}" type="datetimeFigureOut">
               <a:rPr lang="en-AU" smtClean="0"/>
-              <a:t>26/05/2023</a:t>
+              <a:t>29/05/2023</a:t>
             </a:fld>
             <a:endParaRPr lang="en-AU"/>
           </a:p>
@@ -2099,7 +2099,7 @@
           <a:p>
             <a:fld id="{CA6D4F87-9B9E-4A4F-B3AC-3968D7D2EB59}" type="datetimeFigureOut">
               <a:rPr lang="en-AU" smtClean="0"/>
-              <a:t>26/05/2023</a:t>
+              <a:t>29/05/2023</a:t>
             </a:fld>
             <a:endParaRPr lang="en-AU"/>
           </a:p>
@@ -2356,7 +2356,7 @@
           <a:p>
             <a:fld id="{CA6D4F87-9B9E-4A4F-B3AC-3968D7D2EB59}" type="datetimeFigureOut">
               <a:rPr lang="en-AU" smtClean="0"/>
-              <a:t>26/05/2023</a:t>
+              <a:t>29/05/2023</a:t>
             </a:fld>
             <a:endParaRPr lang="en-AU"/>
           </a:p>
@@ -2569,7 +2569,7 @@
           <a:p>
             <a:fld id="{CA6D4F87-9B9E-4A4F-B3AC-3968D7D2EB59}" type="datetimeFigureOut">
               <a:rPr lang="en-AU" smtClean="0"/>
-              <a:t>26/05/2023</a:t>
+              <a:t>29/05/2023</a:t>
             </a:fld>
             <a:endParaRPr lang="en-AU"/>
           </a:p>
@@ -4178,7 +4178,7 @@
         </p:nvSpPr>
         <p:spPr>
           <a:xfrm rot="20774222">
-            <a:off x="69996" y="1553216"/>
+            <a:off x="7049767" y="1721632"/>
             <a:ext cx="2166952" cy="923330"/>
           </a:xfrm>
           <a:prstGeom prst="rect">
@@ -4281,7 +4281,7 @@
           <p:cNvPr id="37" name="Freeform: Shape 16">
             <a:extLst>
               <a:ext uri="{FF2B5EF4-FFF2-40B4-BE49-F238E27FC236}">
-                <a16:creationId xmlns:a16="http://schemas.microsoft.com/office/drawing/2014/main" xmlns="" id="{AFF9FF99-0A06-41A7-BC2C-5003B49B20A1}"/>
+                <a16:creationId xmlns="" xmlns:a16="http://schemas.microsoft.com/office/drawing/2014/main" id="{AFF9FF99-0A06-41A7-BC2C-5003B49B20A1}"/>
               </a:ext>
             </a:extLst>
           </p:cNvPr>
@@ -4459,7 +4459,7 @@
           <p:cNvPr id="38" name="Isosceles Triangle 37">
             <a:extLst>
               <a:ext uri="{FF2B5EF4-FFF2-40B4-BE49-F238E27FC236}">
-                <a16:creationId xmlns:a16="http://schemas.microsoft.com/office/drawing/2014/main" xmlns="" id="{30DE4366-3134-4E79-AD07-B89C53ABF78F}"/>
+                <a16:creationId xmlns="" xmlns:a16="http://schemas.microsoft.com/office/drawing/2014/main" id="{30DE4366-3134-4E79-AD07-B89C53ABF78F}"/>
               </a:ext>
             </a:extLst>
           </p:cNvPr>
@@ -4511,7 +4511,7 @@
           <p:cNvPr id="39" name="Isosceles Triangle 38">
             <a:extLst>
               <a:ext uri="{FF2B5EF4-FFF2-40B4-BE49-F238E27FC236}">
-                <a16:creationId xmlns:a16="http://schemas.microsoft.com/office/drawing/2014/main" xmlns="" id="{98AD1FB3-B4A2-47EF-AEBA-9BB3D41DBFE9}"/>
+                <a16:creationId xmlns="" xmlns:a16="http://schemas.microsoft.com/office/drawing/2014/main" id="{98AD1FB3-B4A2-47EF-AEBA-9BB3D41DBFE9}"/>
               </a:ext>
             </a:extLst>
           </p:cNvPr>
@@ -4563,7 +4563,7 @@
           <p:cNvPr id="40" name="TextBox 39">
             <a:extLst>
               <a:ext uri="{FF2B5EF4-FFF2-40B4-BE49-F238E27FC236}">
-                <a16:creationId xmlns:a16="http://schemas.microsoft.com/office/drawing/2014/main" xmlns="" id="{F357C0F4-92A3-4AE9-8FC3-DEADDEB99F27}"/>
+                <a16:creationId xmlns="" xmlns:a16="http://schemas.microsoft.com/office/drawing/2014/main" id="{F357C0F4-92A3-4AE9-8FC3-DEADDEB99F27}"/>
               </a:ext>
             </a:extLst>
           </p:cNvPr>
@@ -4609,7 +4609,7 @@
           <p:cNvPr id="41" name="Freeform: Shape 20">
             <a:extLst>
               <a:ext uri="{FF2B5EF4-FFF2-40B4-BE49-F238E27FC236}">
-                <a16:creationId xmlns:a16="http://schemas.microsoft.com/office/drawing/2014/main" xmlns="" id="{44090025-7000-4D7D-A74F-0D5873C3CE90}"/>
+                <a16:creationId xmlns="" xmlns:a16="http://schemas.microsoft.com/office/drawing/2014/main" id="{44090025-7000-4D7D-A74F-0D5873C3CE90}"/>
               </a:ext>
             </a:extLst>
           </p:cNvPr>
@@ -4731,7 +4731,7 @@
           <p:cNvPr id="43" name="Picture 42">
             <a:extLst>
               <a:ext uri="{FF2B5EF4-FFF2-40B4-BE49-F238E27FC236}">
-                <a16:creationId xmlns:a16="http://schemas.microsoft.com/office/drawing/2014/main" xmlns="" id="{DF666D98-6E40-4127-BB7F-A63B9E925409}"/>
+                <a16:creationId xmlns="" xmlns:a16="http://schemas.microsoft.com/office/drawing/2014/main" id="{DF666D98-6E40-4127-BB7F-A63B9E925409}"/>
               </a:ext>
             </a:extLst>
           </p:cNvPr>

</xml_diff>